<commit_message>
log likelihood for binomial
</commit_message>
<xml_diff>
--- a/chapter02/Chapter02.pptx
+++ b/chapter02/Chapter02.pptx
@@ -7,8 +7,10 @@
   <p:sldIdLst>
     <p:sldId id="256" r:id="rId2"/>
     <p:sldId id="257" r:id="rId3"/>
-    <p:sldId id="258" r:id="rId4"/>
-    <p:sldId id="259" r:id="rId5"/>
+    <p:sldId id="261" r:id="rId4"/>
+    <p:sldId id="258" r:id="rId5"/>
+    <p:sldId id="259" r:id="rId6"/>
+    <p:sldId id="260" r:id="rId7"/>
   </p:sldIdLst>
   <p:sldSz cx="12192000" cy="6858000"/>
   <p:notesSz cx="6858000" cy="9144000"/>
@@ -107,6 +109,11 @@
       </a:defRPr>
     </a:lvl9pPr>
   </p:defaultTextStyle>
+  <p:extLst>
+    <p:ext uri="{EFAFB233-063F-42B5-8137-9DF3F51BA10A}">
+      <p15:sldGuideLst xmlns:p15="http://schemas.microsoft.com/office/powerpoint/2012/main"/>
+    </p:ext>
+  </p:extLst>
 </p:presentation>
 </file>
 
@@ -259,7 +266,7 @@
           <a:p>
             <a:fld id="{4AF91599-4151-9247-9908-DA7180E1B6D4}" type="datetimeFigureOut">
               <a:rPr lang="en-CH" smtClean="0"/>
-              <a:t>01.04.20</a:t>
+              <a:t>02.04.20</a:t>
             </a:fld>
             <a:endParaRPr lang="en-CH"/>
           </a:p>
@@ -459,7 +466,7 @@
           <a:p>
             <a:fld id="{4AF91599-4151-9247-9908-DA7180E1B6D4}" type="datetimeFigureOut">
               <a:rPr lang="en-CH" smtClean="0"/>
-              <a:t>01.04.20</a:t>
+              <a:t>02.04.20</a:t>
             </a:fld>
             <a:endParaRPr lang="en-CH"/>
           </a:p>
@@ -669,7 +676,7 @@
           <a:p>
             <a:fld id="{4AF91599-4151-9247-9908-DA7180E1B6D4}" type="datetimeFigureOut">
               <a:rPr lang="en-CH" smtClean="0"/>
-              <a:t>01.04.20</a:t>
+              <a:t>02.04.20</a:t>
             </a:fld>
             <a:endParaRPr lang="en-CH"/>
           </a:p>
@@ -869,7 +876,7 @@
           <a:p>
             <a:fld id="{4AF91599-4151-9247-9908-DA7180E1B6D4}" type="datetimeFigureOut">
               <a:rPr lang="en-CH" smtClean="0"/>
-              <a:t>01.04.20</a:t>
+              <a:t>02.04.20</a:t>
             </a:fld>
             <a:endParaRPr lang="en-CH"/>
           </a:p>
@@ -1145,7 +1152,7 @@
           <a:p>
             <a:fld id="{4AF91599-4151-9247-9908-DA7180E1B6D4}" type="datetimeFigureOut">
               <a:rPr lang="en-CH" smtClean="0"/>
-              <a:t>01.04.20</a:t>
+              <a:t>02.04.20</a:t>
             </a:fld>
             <a:endParaRPr lang="en-CH"/>
           </a:p>
@@ -1413,7 +1420,7 @@
           <a:p>
             <a:fld id="{4AF91599-4151-9247-9908-DA7180E1B6D4}" type="datetimeFigureOut">
               <a:rPr lang="en-CH" smtClean="0"/>
-              <a:t>01.04.20</a:t>
+              <a:t>02.04.20</a:t>
             </a:fld>
             <a:endParaRPr lang="en-CH"/>
           </a:p>
@@ -1828,7 +1835,7 @@
           <a:p>
             <a:fld id="{4AF91599-4151-9247-9908-DA7180E1B6D4}" type="datetimeFigureOut">
               <a:rPr lang="en-CH" smtClean="0"/>
-              <a:t>01.04.20</a:t>
+              <a:t>02.04.20</a:t>
             </a:fld>
             <a:endParaRPr lang="en-CH"/>
           </a:p>
@@ -1970,7 +1977,7 @@
           <a:p>
             <a:fld id="{4AF91599-4151-9247-9908-DA7180E1B6D4}" type="datetimeFigureOut">
               <a:rPr lang="en-CH" smtClean="0"/>
-              <a:t>01.04.20</a:t>
+              <a:t>02.04.20</a:t>
             </a:fld>
             <a:endParaRPr lang="en-CH"/>
           </a:p>
@@ -2083,7 +2090,7 @@
           <a:p>
             <a:fld id="{4AF91599-4151-9247-9908-DA7180E1B6D4}" type="datetimeFigureOut">
               <a:rPr lang="en-CH" smtClean="0"/>
-              <a:t>01.04.20</a:t>
+              <a:t>02.04.20</a:t>
             </a:fld>
             <a:endParaRPr lang="en-CH"/>
           </a:p>
@@ -2396,7 +2403,7 @@
           <a:p>
             <a:fld id="{4AF91599-4151-9247-9908-DA7180E1B6D4}" type="datetimeFigureOut">
               <a:rPr lang="en-CH" smtClean="0"/>
-              <a:t>01.04.20</a:t>
+              <a:t>02.04.20</a:t>
             </a:fld>
             <a:endParaRPr lang="en-CH"/>
           </a:p>
@@ -2685,7 +2692,7 @@
           <a:p>
             <a:fld id="{4AF91599-4151-9247-9908-DA7180E1B6D4}" type="datetimeFigureOut">
               <a:rPr lang="en-CH" smtClean="0"/>
-              <a:t>01.04.20</a:t>
+              <a:t>02.04.20</a:t>
             </a:fld>
             <a:endParaRPr lang="en-CH"/>
           </a:p>
@@ -2928,7 +2935,7 @@
           <a:p>
             <a:fld id="{4AF91599-4151-9247-9908-DA7180E1B6D4}" type="datetimeFigureOut">
               <a:rPr lang="en-CH" smtClean="0"/>
-              <a:t>01.04.20</a:t>
+              <a:t>02.04.20</a:t>
             </a:fld>
             <a:endParaRPr lang="en-CH"/>
           </a:p>
@@ -3444,7 +3451,7 @@
         <p:spPr>
           <a:xfrm>
             <a:off x="2435087" y="1172817"/>
-            <a:ext cx="2330574" cy="2585323"/>
+            <a:ext cx="13782427" cy="3970318"/>
           </a:xfrm>
           <a:prstGeom prst="rect">
             <a:avLst/>
@@ -3526,6 +3533,46 @@
             <a:r>
               <a:rPr lang="en-CH" dirty="0"/>
               <a:t>ifferentiation rules</a:t>
+            </a:r>
+          </a:p>
+          <a:p>
+            <a:endParaRPr lang="en-CH" dirty="0"/>
+          </a:p>
+          <a:p>
+            <a:r>
+              <a:rPr lang="en-GB" dirty="0"/>
+              <a:t>R</a:t>
+            </a:r>
+            <a:r>
+              <a:rPr lang="en-CH" dirty="0"/>
+              <a:t>egression</a:t>
+            </a:r>
+          </a:p>
+          <a:p>
+            <a:r>
+              <a:rPr lang="en-GB" dirty="0"/>
+              <a:t>R</a:t>
+            </a:r>
+            <a:r>
+              <a:rPr lang="en-CH" dirty="0"/>
+              <a:t>esiduals</a:t>
+            </a:r>
+          </a:p>
+          <a:p>
+            <a:r>
+              <a:rPr lang="en-CH" dirty="0"/>
+              <a:t> phat    </a:t>
+            </a:r>
+            <a:r>
+              <a:rPr lang="en-GB" dirty="0"/>
+              <a:t>We put a hat over the letter to remind us that this is not (necessarily) the underlying true value, but an estimate we make from the data</a:t>
+            </a:r>
+            <a:endParaRPr lang="en-CH" dirty="0"/>
+          </a:p>
+          <a:p>
+            <a:r>
+              <a:rPr lang="en-CH" dirty="0"/>
+              <a:t>poverline</a:t>
             </a:r>
           </a:p>
         </p:txBody>
@@ -3562,10 +3609,10 @@
       </p:grpSpPr>
       <p:pic>
         <p:nvPicPr>
-          <p:cNvPr id="4" name="Picture 3">
-            <a:extLst>
-              <a:ext uri="{FF2B5EF4-FFF2-40B4-BE49-F238E27FC236}">
-                <a16:creationId xmlns:a16="http://schemas.microsoft.com/office/drawing/2014/main" id="{5AEFBD1C-2E37-604C-A66C-C33713025C9C}"/>
+          <p:cNvPr id="5" name="Picture 4">
+            <a:extLst>
+              <a:ext uri="{FF2B5EF4-FFF2-40B4-BE49-F238E27FC236}">
+                <a16:creationId xmlns:a16="http://schemas.microsoft.com/office/drawing/2014/main" id="{98279FEB-1179-3E47-9D7B-8906CCAF519C}"/>
               </a:ext>
             </a:extLst>
           </p:cNvPr>
@@ -3582,92 +3629,48 @@
         </p:blipFill>
         <p:spPr>
           <a:xfrm>
-            <a:off x="2538888" y="928377"/>
-            <a:ext cx="6827534" cy="4458601"/>
+            <a:off x="658813" y="1333499"/>
+            <a:ext cx="4691626" cy="3895725"/>
           </a:xfrm>
           <a:prstGeom prst="rect">
             <a:avLst/>
           </a:prstGeom>
         </p:spPr>
       </p:pic>
-      <p:sp>
-        <p:nvSpPr>
-          <p:cNvPr id="9" name="TextBox 8">
-            <a:extLst>
-              <a:ext uri="{FF2B5EF4-FFF2-40B4-BE49-F238E27FC236}">
-                <a16:creationId xmlns:a16="http://schemas.microsoft.com/office/drawing/2014/main" id="{606741E3-A0B4-7A43-9871-C658108E4F04}"/>
-              </a:ext>
-            </a:extLst>
-          </p:cNvPr>
-          <p:cNvSpPr txBox="1"/>
+      <p:pic>
+        <p:nvPicPr>
+          <p:cNvPr id="7" name="Picture 6">
+            <a:extLst>
+              <a:ext uri="{FF2B5EF4-FFF2-40B4-BE49-F238E27FC236}">
+                <a16:creationId xmlns:a16="http://schemas.microsoft.com/office/drawing/2014/main" id="{6CD4AC86-B8F3-2545-88EA-EF7FCAC9A4FB}"/>
+              </a:ext>
+            </a:extLst>
+          </p:cNvPr>
+          <p:cNvPicPr>
+            <a:picLocks noChangeAspect="1"/>
+          </p:cNvPicPr>
           <p:nvPr/>
-        </p:nvSpPr>
+        </p:nvPicPr>
+        <p:blipFill>
+          <a:blip r:embed="rId3"/>
+          <a:stretch>
+            <a:fillRect/>
+          </a:stretch>
+        </p:blipFill>
         <p:spPr>
           <a:xfrm>
-            <a:off x="827903" y="345989"/>
-            <a:ext cx="7176580" cy="369332"/>
+            <a:off x="5016499" y="1333499"/>
+            <a:ext cx="5756275" cy="4348265"/>
           </a:xfrm>
           <a:prstGeom prst="rect">
             <a:avLst/>
           </a:prstGeom>
-          <a:noFill/>
         </p:spPr>
-        <p:txBody>
-          <a:bodyPr wrap="none" rtlCol="0">
-            <a:spAutoFit/>
-          </a:bodyPr>
-          <a:lstStyle/>
-          <a:p>
-            <a:r>
-              <a:rPr lang="en-CH" b="1" dirty="0"/>
-              <a:t>Proof that the mean of the Poisson distribution maximises the likelihood:</a:t>
-            </a:r>
-          </a:p>
-        </p:txBody>
-      </p:sp>
-      <p:sp>
-        <p:nvSpPr>
-          <p:cNvPr id="10" name="TextBox 9">
-            <a:extLst>
-              <a:ext uri="{FF2B5EF4-FFF2-40B4-BE49-F238E27FC236}">
-                <a16:creationId xmlns:a16="http://schemas.microsoft.com/office/drawing/2014/main" id="{D921AA62-A811-0F47-922A-0A6292E0C9AE}"/>
-              </a:ext>
-            </a:extLst>
-          </p:cNvPr>
-          <p:cNvSpPr txBox="1"/>
-          <p:nvPr/>
-        </p:nvSpPr>
-        <p:spPr>
-          <a:xfrm>
-            <a:off x="3954162" y="6153665"/>
-            <a:ext cx="5159682" cy="369332"/>
-          </a:xfrm>
-          <a:prstGeom prst="rect">
-            <a:avLst/>
-          </a:prstGeom>
-          <a:noFill/>
-        </p:spPr>
-        <p:txBody>
-          <a:bodyPr wrap="none" rtlCol="0">
-            <a:spAutoFit/>
-          </a:bodyPr>
-          <a:lstStyle/>
-          <a:p>
-            <a:r>
-              <a:rPr lang="en-GB" dirty="0"/>
-              <a:t>…. A</a:t>
-            </a:r>
-            <a:r>
-              <a:rPr lang="en-CH" dirty="0"/>
-              <a:t> more detailed working out is on the next slide….</a:t>
-            </a:r>
-          </a:p>
-        </p:txBody>
-      </p:sp>
+      </p:pic>
     </p:spTree>
     <p:extLst>
       <p:ext uri="{BB962C8B-B14F-4D97-AF65-F5344CB8AC3E}">
-        <p14:creationId xmlns:p14="http://schemas.microsoft.com/office/powerpoint/2010/main" val="3922666418"/>
+        <p14:creationId xmlns:p14="http://schemas.microsoft.com/office/powerpoint/2010/main" val="3322812182"/>
       </p:ext>
     </p:extLst>
   </p:cSld>
@@ -3694,6 +3697,140 @@
           <a:chExt cx="0" cy="0"/>
         </a:xfrm>
       </p:grpSpPr>
+      <p:pic>
+        <p:nvPicPr>
+          <p:cNvPr id="4" name="Picture 3">
+            <a:extLst>
+              <a:ext uri="{FF2B5EF4-FFF2-40B4-BE49-F238E27FC236}">
+                <a16:creationId xmlns:a16="http://schemas.microsoft.com/office/drawing/2014/main" id="{5AEFBD1C-2E37-604C-A66C-C33713025C9C}"/>
+              </a:ext>
+            </a:extLst>
+          </p:cNvPr>
+          <p:cNvPicPr>
+            <a:picLocks noChangeAspect="1"/>
+          </p:cNvPicPr>
+          <p:nvPr/>
+        </p:nvPicPr>
+        <p:blipFill>
+          <a:blip r:embed="rId2"/>
+          <a:stretch>
+            <a:fillRect/>
+          </a:stretch>
+        </p:blipFill>
+        <p:spPr>
+          <a:xfrm>
+            <a:off x="2538888" y="928377"/>
+            <a:ext cx="6827534" cy="4458601"/>
+          </a:xfrm>
+          <a:prstGeom prst="rect">
+            <a:avLst/>
+          </a:prstGeom>
+        </p:spPr>
+      </p:pic>
+      <p:sp>
+        <p:nvSpPr>
+          <p:cNvPr id="9" name="TextBox 8">
+            <a:extLst>
+              <a:ext uri="{FF2B5EF4-FFF2-40B4-BE49-F238E27FC236}">
+                <a16:creationId xmlns:a16="http://schemas.microsoft.com/office/drawing/2014/main" id="{606741E3-A0B4-7A43-9871-C658108E4F04}"/>
+              </a:ext>
+            </a:extLst>
+          </p:cNvPr>
+          <p:cNvSpPr txBox="1"/>
+          <p:nvPr/>
+        </p:nvSpPr>
+        <p:spPr>
+          <a:xfrm>
+            <a:off x="827903" y="345989"/>
+            <a:ext cx="7176580" cy="369332"/>
+          </a:xfrm>
+          <a:prstGeom prst="rect">
+            <a:avLst/>
+          </a:prstGeom>
+          <a:noFill/>
+        </p:spPr>
+        <p:txBody>
+          <a:bodyPr wrap="none" rtlCol="0">
+            <a:spAutoFit/>
+          </a:bodyPr>
+          <a:lstStyle/>
+          <a:p>
+            <a:r>
+              <a:rPr lang="en-CH" b="1" dirty="0"/>
+              <a:t>Proof that the mean of the Poisson distribution maximises the likelihood:</a:t>
+            </a:r>
+          </a:p>
+        </p:txBody>
+      </p:sp>
+      <p:sp>
+        <p:nvSpPr>
+          <p:cNvPr id="10" name="TextBox 9">
+            <a:extLst>
+              <a:ext uri="{FF2B5EF4-FFF2-40B4-BE49-F238E27FC236}">
+                <a16:creationId xmlns:a16="http://schemas.microsoft.com/office/drawing/2014/main" id="{D921AA62-A811-0F47-922A-0A6292E0C9AE}"/>
+              </a:ext>
+            </a:extLst>
+          </p:cNvPr>
+          <p:cNvSpPr txBox="1"/>
+          <p:nvPr/>
+        </p:nvSpPr>
+        <p:spPr>
+          <a:xfrm>
+            <a:off x="3954162" y="6153665"/>
+            <a:ext cx="5159682" cy="369332"/>
+          </a:xfrm>
+          <a:prstGeom prst="rect">
+            <a:avLst/>
+          </a:prstGeom>
+          <a:noFill/>
+        </p:spPr>
+        <p:txBody>
+          <a:bodyPr wrap="none" rtlCol="0">
+            <a:spAutoFit/>
+          </a:bodyPr>
+          <a:lstStyle/>
+          <a:p>
+            <a:r>
+              <a:rPr lang="en-GB" dirty="0"/>
+              <a:t>…. A</a:t>
+            </a:r>
+            <a:r>
+              <a:rPr lang="en-CH" dirty="0"/>
+              <a:t> more detailed working out is on the next slide….</a:t>
+            </a:r>
+          </a:p>
+        </p:txBody>
+      </p:sp>
+    </p:spTree>
+    <p:extLst>
+      <p:ext uri="{BB962C8B-B14F-4D97-AF65-F5344CB8AC3E}">
+        <p14:creationId xmlns:p14="http://schemas.microsoft.com/office/powerpoint/2010/main" val="3922666418"/>
+      </p:ext>
+    </p:extLst>
+  </p:cSld>
+  <p:clrMapOvr>
+    <a:masterClrMapping/>
+  </p:clrMapOvr>
+</p:sld>
+</file>
+
+<file path=ppt/slides/slide5.xml><?xml version="1.0" encoding="utf-8"?>
+<p:sld xmlns:a="http://schemas.openxmlformats.org/drawingml/2006/main" xmlns:r="http://schemas.openxmlformats.org/officeDocument/2006/relationships" xmlns:p="http://schemas.openxmlformats.org/presentationml/2006/main">
+  <p:cSld>
+    <p:spTree>
+      <p:nvGrpSpPr>
+        <p:cNvPr id="1" name=""/>
+        <p:cNvGrpSpPr/>
+        <p:nvPr/>
+      </p:nvGrpSpPr>
+      <p:grpSpPr>
+        <a:xfrm>
+          <a:off x="0" y="0"/>
+          <a:ext cx="0" cy="0"/>
+          <a:chOff x="0" y="0"/>
+          <a:chExt cx="0" cy="0"/>
+        </a:xfrm>
+      </p:grpSpPr>
       <p:sp>
         <p:nvSpPr>
           <p:cNvPr id="9" name="TextBox 8">
@@ -3793,6 +3930,130 @@
     <p:extLst>
       <p:ext uri="{BB962C8B-B14F-4D97-AF65-F5344CB8AC3E}">
         <p14:creationId xmlns:p14="http://schemas.microsoft.com/office/powerpoint/2010/main" val="1134133447"/>
+      </p:ext>
+    </p:extLst>
+  </p:cSld>
+  <p:clrMapOvr>
+    <a:masterClrMapping/>
+  </p:clrMapOvr>
+</p:sld>
+</file>
+
+<file path=ppt/slides/slide6.xml><?xml version="1.0" encoding="utf-8"?>
+<p:sld xmlns:a="http://schemas.openxmlformats.org/drawingml/2006/main" xmlns:r="http://schemas.openxmlformats.org/officeDocument/2006/relationships" xmlns:p="http://schemas.openxmlformats.org/presentationml/2006/main">
+  <p:cSld>
+    <p:spTree>
+      <p:nvGrpSpPr>
+        <p:cNvPr id="1" name=""/>
+        <p:cNvGrpSpPr/>
+        <p:nvPr/>
+      </p:nvGrpSpPr>
+      <p:grpSpPr>
+        <a:xfrm>
+          <a:off x="0" y="0"/>
+          <a:ext cx="0" cy="0"/>
+          <a:chOff x="0" y="0"/>
+          <a:chExt cx="0" cy="0"/>
+        </a:xfrm>
+      </p:grpSpPr>
+      <p:sp>
+        <p:nvSpPr>
+          <p:cNvPr id="4" name="TextBox 3">
+            <a:extLst>
+              <a:ext uri="{FF2B5EF4-FFF2-40B4-BE49-F238E27FC236}">
+                <a16:creationId xmlns:a16="http://schemas.microsoft.com/office/drawing/2014/main" id="{3FD9908E-4E6B-AF4F-98B4-02B686F412D8}"/>
+              </a:ext>
+            </a:extLst>
+          </p:cNvPr>
+          <p:cNvSpPr txBox="1"/>
+          <p:nvPr/>
+        </p:nvSpPr>
+        <p:spPr>
+          <a:xfrm>
+            <a:off x="228600" y="503896"/>
+            <a:ext cx="5185522" cy="461665"/>
+          </a:xfrm>
+          <a:prstGeom prst="rect">
+            <a:avLst/>
+          </a:prstGeom>
+          <a:noFill/>
+        </p:spPr>
+        <p:txBody>
+          <a:bodyPr wrap="none" rtlCol="0">
+            <a:spAutoFit/>
+          </a:bodyPr>
+          <a:lstStyle/>
+          <a:p>
+            <a:r>
+              <a:rPr lang="en-GB" sz="2400" b="1" dirty="0"/>
+              <a:t>Likelihood for the binomial distribution</a:t>
+            </a:r>
+          </a:p>
+        </p:txBody>
+      </p:sp>
+      <p:pic>
+        <p:nvPicPr>
+          <p:cNvPr id="5" name="Picture 4">
+            <a:extLst>
+              <a:ext uri="{FF2B5EF4-FFF2-40B4-BE49-F238E27FC236}">
+                <a16:creationId xmlns:a16="http://schemas.microsoft.com/office/drawing/2014/main" id="{D49DC3DA-D876-CD47-9D1C-FEFD3010B10D}"/>
+              </a:ext>
+            </a:extLst>
+          </p:cNvPr>
+          <p:cNvPicPr>
+            <a:picLocks noChangeAspect="1"/>
+          </p:cNvPicPr>
+          <p:nvPr/>
+        </p:nvPicPr>
+        <p:blipFill rotWithShape="1">
+          <a:blip r:embed="rId2"/>
+          <a:srcRect b="6923"/>
+          <a:stretch/>
+        </p:blipFill>
+        <p:spPr>
+          <a:xfrm>
+            <a:off x="228600" y="1337139"/>
+            <a:ext cx="5575991" cy="2977686"/>
+          </a:xfrm>
+          <a:prstGeom prst="rect">
+            <a:avLst/>
+          </a:prstGeom>
+        </p:spPr>
+      </p:pic>
+      <p:pic>
+        <p:nvPicPr>
+          <p:cNvPr id="8" name="Picture 7">
+            <a:extLst>
+              <a:ext uri="{FF2B5EF4-FFF2-40B4-BE49-F238E27FC236}">
+                <a16:creationId xmlns:a16="http://schemas.microsoft.com/office/drawing/2014/main" id="{6AF61FBF-9221-5741-ACBA-AF0C71159486}"/>
+              </a:ext>
+            </a:extLst>
+          </p:cNvPr>
+          <p:cNvPicPr>
+            <a:picLocks noChangeAspect="1"/>
+          </p:cNvPicPr>
+          <p:nvPr/>
+        </p:nvPicPr>
+        <p:blipFill>
+          <a:blip r:embed="rId3"/>
+          <a:stretch>
+            <a:fillRect/>
+          </a:stretch>
+        </p:blipFill>
+        <p:spPr>
+          <a:xfrm>
+            <a:off x="5918200" y="1225550"/>
+            <a:ext cx="6273800" cy="4406900"/>
+          </a:xfrm>
+          <a:prstGeom prst="rect">
+            <a:avLst/>
+          </a:prstGeom>
+        </p:spPr>
+      </p:pic>
+    </p:spTree>
+    <p:extLst>
+      <p:ext uri="{BB962C8B-B14F-4D97-AF65-F5344CB8AC3E}">
+        <p14:creationId xmlns:p14="http://schemas.microsoft.com/office/powerpoint/2010/main" val="1208430400"/>
       </p:ext>
     </p:extLst>
   </p:cSld>

</xml_diff>